<commit_message>
ACTUALIZACIÓN DIAGRAMA DE GANTT
Se ingresa la ultima version de nuestro cronograma de actividades y actualización de presentación de en power point
</commit_message>
<xml_diff>
--- a/Documentacion/Presentacion/Proyecto Quickgift 4Trim.pptx
+++ b/Documentacion/Presentacion/Proyecto Quickgift 4Trim.pptx
@@ -300,7 +300,7 @@
       </p15:notesGuideLst>
     </p:ext>
     <p:ext uri="http://customooxmlschemas.google.com/">
-      <go:slidesCustomData xmlns="" xmlns:mc="http://schemas.openxmlformats.org/markup-compatibility/2006" xmlns:mv="urn:schemas-microsoft-com:mac:vml" xmlns:c="http://schemas.openxmlformats.org/drawingml/2006/chart" xmlns:dgm="http://schemas.openxmlformats.org/drawingml/2006/diagram" xmlns:o="urn:schemas-microsoft-com:office:office" xmlns:v="urn:schemas-microsoft-com:vml" xmlns:pvml="urn:schemas-microsoft-com:office:powerpoint" xmlns:com="http://schemas.openxmlformats.org/drawingml/2006/compatibility" xmlns:p14="http://schemas.microsoft.com/office/powerpoint/2010/main" xmlns:p15="http://schemas.microsoft.com/office/powerpoint/2012/main" xmlns:go="http://customooxmlschemas.google.com/" r:id="rId35" roundtripDataSignature="AMtx7miSNXYSRgmSWm+S1qHCn9iJbBHPKA=="/>
+      <go:slidesCustomData xmlns:go="http://customooxmlschemas.google.com/" xmlns:p15="http://schemas.microsoft.com/office/powerpoint/2012/main" xmlns:p14="http://schemas.microsoft.com/office/powerpoint/2010/main" xmlns:com="http://schemas.openxmlformats.org/drawingml/2006/compatibility" xmlns:pvml="urn:schemas-microsoft-com:office:powerpoint" xmlns:v="urn:schemas-microsoft-com:vml" xmlns:o="urn:schemas-microsoft-com:office:office" xmlns:dgm="http://schemas.openxmlformats.org/drawingml/2006/diagram" xmlns:c="http://schemas.openxmlformats.org/drawingml/2006/chart" xmlns:mv="urn:schemas-microsoft-com:mac:vml" xmlns:mc="http://schemas.openxmlformats.org/markup-compatibility/2006" xmlns="" r:id="rId35" roundtripDataSignature="AMtx7miSNXYSRgmSWm+S1qHCn9iJbBHPKA=="/>
     </p:ext>
   </p:extLst>
 </p:presentation>
@@ -12550,7 +12550,7 @@
           <p:cNvPr id="2" name="Rectángulo 1">
             <a:extLst>
               <a:ext uri="{FF2B5EF4-FFF2-40B4-BE49-F238E27FC236}">
-                <a16:creationId xmlns:a16="http://schemas.microsoft.com/office/drawing/2014/main" xmlns="" id="{2122DDA5-564B-4B5D-A09C-EACFD56F1273}"/>
+                <a16:creationId xmlns="" xmlns:a16="http://schemas.microsoft.com/office/drawing/2014/main" id="{2122DDA5-564B-4B5D-A09C-EACFD56F1273}"/>
               </a:ext>
             </a:extLst>
           </p:cNvPr>
@@ -12625,7 +12625,7 @@
           <p:cNvPr id="3" name="Rectángulo 2">
             <a:extLst>
               <a:ext uri="{FF2B5EF4-FFF2-40B4-BE49-F238E27FC236}">
-                <a16:creationId xmlns:a16="http://schemas.microsoft.com/office/drawing/2014/main" xmlns="" id="{5913FDBA-2C35-4A5B-AE6E-1329BD4F43F2}"/>
+                <a16:creationId xmlns="" xmlns:a16="http://schemas.microsoft.com/office/drawing/2014/main" id="{5913FDBA-2C35-4A5B-AE6E-1329BD4F43F2}"/>
               </a:ext>
             </a:extLst>
           </p:cNvPr>
@@ -12679,7 +12679,7 @@
           <p:cNvPr id="4" name="Picture 2" descr="Entrevista por Competências - Território RH">
             <a:extLst>
               <a:ext uri="{FF2B5EF4-FFF2-40B4-BE49-F238E27FC236}">
-                <a16:creationId xmlns:a16="http://schemas.microsoft.com/office/drawing/2014/main" xmlns="" id="{4DAC0672-5CE0-4E04-AE20-D87CB01F6303}"/>
+                <a16:creationId xmlns="" xmlns:a16="http://schemas.microsoft.com/office/drawing/2014/main" id="{4DAC0672-5CE0-4E04-AE20-D87CB01F6303}"/>
               </a:ext>
             </a:extLst>
           </p:cNvPr>
@@ -12733,7 +12733,7 @@
             <a:hlinkClick r:id="rId3" action="ppaction://hlinkfile"/>
             <a:extLst>
               <a:ext uri="{FF2B5EF4-FFF2-40B4-BE49-F238E27FC236}">
-                <a16:creationId xmlns:a16="http://schemas.microsoft.com/office/drawing/2014/main" xmlns="" id="{9657310C-B58A-45F9-BEDE-26FFF76A2482}"/>
+                <a16:creationId xmlns="" xmlns:a16="http://schemas.microsoft.com/office/drawing/2014/main" id="{9657310C-B58A-45F9-BEDE-26FFF76A2482}"/>
               </a:ext>
             </a:extLst>
           </p:cNvPr>
@@ -12928,7 +12928,7 @@
           <p:cNvPr id="2" name="Rectángulo 1">
             <a:extLst>
               <a:ext uri="{FF2B5EF4-FFF2-40B4-BE49-F238E27FC236}">
-                <a16:creationId xmlns:a16="http://schemas.microsoft.com/office/drawing/2014/main" xmlns="" id="{7087B882-47C7-4CA3-9B73-7C8416C4340E}"/>
+                <a16:creationId xmlns="" xmlns:a16="http://schemas.microsoft.com/office/drawing/2014/main" id="{7087B882-47C7-4CA3-9B73-7C8416C4340E}"/>
               </a:ext>
             </a:extLst>
           </p:cNvPr>
@@ -12970,7 +12970,7 @@
             <a:hlinkClick r:id="rId3" action="ppaction://hlinkfile"/>
             <a:extLst>
               <a:ext uri="{FF2B5EF4-FFF2-40B4-BE49-F238E27FC236}">
-                <a16:creationId xmlns:a16="http://schemas.microsoft.com/office/drawing/2014/main" xmlns="" id="{735BB9A9-C171-4A45-B985-CED9BB18E5E2}"/>
+                <a16:creationId xmlns="" xmlns:a16="http://schemas.microsoft.com/office/drawing/2014/main" id="{735BB9A9-C171-4A45-B985-CED9BB18E5E2}"/>
               </a:ext>
             </a:extLst>
           </p:cNvPr>
@@ -13074,7 +13074,7 @@
           <p:cNvPr id="1026" name="Picture 2" descr="Curso Toma de Requerimientos | EVORYT®">
             <a:extLst>
               <a:ext uri="{FF2B5EF4-FFF2-40B4-BE49-F238E27FC236}">
-                <a16:creationId xmlns:a16="http://schemas.microsoft.com/office/drawing/2014/main" xmlns="" id="{54B8095A-CA67-4874-A7BA-6526D9D0EB70}"/>
+                <a16:creationId xmlns="" xmlns:a16="http://schemas.microsoft.com/office/drawing/2014/main" id="{54B8095A-CA67-4874-A7BA-6526D9D0EB70}"/>
               </a:ext>
             </a:extLst>
           </p:cNvPr>
@@ -13209,7 +13209,7 @@
             <a:hlinkClick r:id="rId5" action="ppaction://hlinkfile"/>
             <a:extLst>
               <a:ext uri="{FF2B5EF4-FFF2-40B4-BE49-F238E27FC236}">
-                <a16:creationId xmlns:a16="http://schemas.microsoft.com/office/drawing/2014/main" xmlns="" id="{05A6B6DB-84D5-43BD-82A5-1DFF7D2F4C54}"/>
+                <a16:creationId xmlns="" xmlns:a16="http://schemas.microsoft.com/office/drawing/2014/main" id="{05A6B6DB-84D5-43BD-82A5-1DFF7D2F4C54}"/>
               </a:ext>
             </a:extLst>
           </p:cNvPr>
@@ -13849,7 +13849,7 @@
           <p:cNvPr id="3" name="Google Shape;274;p15">
             <a:extLst>
               <a:ext uri="{FF2B5EF4-FFF2-40B4-BE49-F238E27FC236}">
-                <a16:creationId xmlns:a16="http://schemas.microsoft.com/office/drawing/2014/main" xmlns="" id="{38572213-7C37-44AC-9849-B6D5D3815AE0}"/>
+                <a16:creationId xmlns="" xmlns:a16="http://schemas.microsoft.com/office/drawing/2014/main" id="{38572213-7C37-44AC-9849-B6D5D3815AE0}"/>
               </a:ext>
             </a:extLst>
           </p:cNvPr>
@@ -13905,7 +13905,7 @@
           <p:cNvPr id="4" name="Google Shape;276;p15">
             <a:extLst>
               <a:ext uri="{FF2B5EF4-FFF2-40B4-BE49-F238E27FC236}">
-                <a16:creationId xmlns:a16="http://schemas.microsoft.com/office/drawing/2014/main" xmlns="" id="{5B376D5C-FF48-41DD-A0A8-53394A550E8D}"/>
+                <a16:creationId xmlns="" xmlns:a16="http://schemas.microsoft.com/office/drawing/2014/main" id="{5B376D5C-FF48-41DD-A0A8-53394A550E8D}"/>
               </a:ext>
             </a:extLst>
           </p:cNvPr>
@@ -13969,7 +13969,7 @@
           <p:cNvPr id="5" name="Picture 2" descr="Tareas De La Planificación Del Trabajo En Equipo, De La ...">
             <a:extLst>
               <a:ext uri="{FF2B5EF4-FFF2-40B4-BE49-F238E27FC236}">
-                <a16:creationId xmlns:a16="http://schemas.microsoft.com/office/drawing/2014/main" xmlns="" id="{63540C2B-2C8B-4D8B-9193-BF9D8F886424}"/>
+                <a16:creationId xmlns="" xmlns:a16="http://schemas.microsoft.com/office/drawing/2014/main" id="{63540C2B-2C8B-4D8B-9193-BF9D8F886424}"/>
               </a:ext>
             </a:extLst>
           </p:cNvPr>
@@ -14017,7 +14017,7 @@
             <a:hlinkClick r:id="rId3"/>
             <a:extLst>
               <a:ext uri="{FF2B5EF4-FFF2-40B4-BE49-F238E27FC236}">
-                <a16:creationId xmlns:a16="http://schemas.microsoft.com/office/drawing/2014/main" xmlns="" id="{CF0D17DD-99A5-4557-8E36-67F6E3CC1483}"/>
+                <a16:creationId xmlns="" xmlns:a16="http://schemas.microsoft.com/office/drawing/2014/main" id="{CF0D17DD-99A5-4557-8E36-67F6E3CC1483}"/>
               </a:ext>
             </a:extLst>
           </p:cNvPr>
@@ -14061,7 +14061,7 @@
                 <a:ea typeface="Calibri"/>
                 <a:cs typeface="Times New Roman" panose="02020603050405020304" pitchFamily="18" charset="0"/>
                 <a:sym typeface="Calibri"/>
-                <a:hlinkClick r:id="rId3"/>
+                <a:hlinkClick r:id="rId4" action="ppaction://hlinkfile"/>
               </a:rPr>
               <a:t>Cronograma</a:t>
             </a:r>
@@ -14162,7 +14162,7 @@
           <p:cNvPr id="4" name="Imagen 3" descr="Imagen que contiene texto&#10;&#10;Descripción generada automáticamente">
             <a:extLst>
               <a:ext uri="{FF2B5EF4-FFF2-40B4-BE49-F238E27FC236}">
-                <a16:creationId xmlns:a16="http://schemas.microsoft.com/office/drawing/2014/main" xmlns="" id="{76644C9E-E95A-428F-8052-DB1D0AE3A13E}"/>
+                <a16:creationId xmlns="" xmlns:a16="http://schemas.microsoft.com/office/drawing/2014/main" id="{76644C9E-E95A-428F-8052-DB1D0AE3A13E}"/>
               </a:ext>
             </a:extLst>
           </p:cNvPr>
@@ -14231,7 +14231,7 @@
           <p:cNvPr id="2" name="Google Shape;281;p16">
             <a:extLst>
               <a:ext uri="{FF2B5EF4-FFF2-40B4-BE49-F238E27FC236}">
-                <a16:creationId xmlns:a16="http://schemas.microsoft.com/office/drawing/2014/main" xmlns="" id="{CE6A4691-A129-4957-A61B-EE45E727709F}"/>
+                <a16:creationId xmlns="" xmlns:a16="http://schemas.microsoft.com/office/drawing/2014/main" id="{CE6A4691-A129-4957-A61B-EE45E727709F}"/>
               </a:ext>
             </a:extLst>
           </p:cNvPr>
@@ -14307,7 +14307,7 @@
           <p:cNvPr id="3" name="Google Shape;289;p17">
             <a:extLst>
               <a:ext uri="{FF2B5EF4-FFF2-40B4-BE49-F238E27FC236}">
-                <a16:creationId xmlns:a16="http://schemas.microsoft.com/office/drawing/2014/main" xmlns="" id="{008198B5-C4F6-4021-AB1D-FB69EC845007}"/>
+                <a16:creationId xmlns="" xmlns:a16="http://schemas.microsoft.com/office/drawing/2014/main" id="{008198B5-C4F6-4021-AB1D-FB69EC845007}"/>
               </a:ext>
             </a:extLst>
           </p:cNvPr>
@@ -14363,7 +14363,7 @@
           <p:cNvPr id="4" name="Google Shape;290;p17">
             <a:extLst>
               <a:ext uri="{FF2B5EF4-FFF2-40B4-BE49-F238E27FC236}">
-                <a16:creationId xmlns:a16="http://schemas.microsoft.com/office/drawing/2014/main" xmlns="" id="{E0BA332A-F194-47C7-97DC-EA1CDA7851A6}"/>
+                <a16:creationId xmlns="" xmlns:a16="http://schemas.microsoft.com/office/drawing/2014/main" id="{E0BA332A-F194-47C7-97DC-EA1CDA7851A6}"/>
               </a:ext>
             </a:extLst>
           </p:cNvPr>
@@ -14396,7 +14396,7 @@
           <p:cNvPr id="5" name="Google Shape;288;p17">
             <a:extLst>
               <a:ext uri="{FF2B5EF4-FFF2-40B4-BE49-F238E27FC236}">
-                <a16:creationId xmlns:a16="http://schemas.microsoft.com/office/drawing/2014/main" xmlns="" id="{3291A153-D720-4498-8F38-F25458F9A579}"/>
+                <a16:creationId xmlns="" xmlns:a16="http://schemas.microsoft.com/office/drawing/2014/main" id="{3291A153-D720-4498-8F38-F25458F9A579}"/>
               </a:ext>
             </a:extLst>
           </p:cNvPr>
@@ -14618,7 +14618,7 @@
           <p:cNvPr id="2" name="Rectángulo 1">
             <a:extLst>
               <a:ext uri="{FF2B5EF4-FFF2-40B4-BE49-F238E27FC236}">
-                <a16:creationId xmlns:a16="http://schemas.microsoft.com/office/drawing/2014/main" xmlns="" id="{945477C0-F7CF-4427-81CB-CDD601B86DD9}"/>
+                <a16:creationId xmlns="" xmlns:a16="http://schemas.microsoft.com/office/drawing/2014/main" id="{945477C0-F7CF-4427-81CB-CDD601B86DD9}"/>
               </a:ext>
             </a:extLst>
           </p:cNvPr>
@@ -14680,7 +14680,7 @@
           <p:cNvPr id="2" name="Google Shape;134;p1">
             <a:extLst>
               <a:ext uri="{FF2B5EF4-FFF2-40B4-BE49-F238E27FC236}">
-                <a16:creationId xmlns:a16="http://schemas.microsoft.com/office/drawing/2014/main" xmlns="" id="{89006225-9AC6-4B7F-A20B-8222B852191D}"/>
+                <a16:creationId xmlns="" xmlns:a16="http://schemas.microsoft.com/office/drawing/2014/main" id="{89006225-9AC6-4B7F-A20B-8222B852191D}"/>
               </a:ext>
             </a:extLst>
           </p:cNvPr>
@@ -15135,7 +15135,7 @@
           <p:cNvPr id="8" name="Google Shape;301;p19">
             <a:extLst>
               <a:ext uri="{FF2B5EF4-FFF2-40B4-BE49-F238E27FC236}">
-                <a16:creationId xmlns:a16="http://schemas.microsoft.com/office/drawing/2014/main" xmlns="" id="{F94E0085-60CE-404C-BCAC-0CF9854A434A}"/>
+                <a16:creationId xmlns="" xmlns:a16="http://schemas.microsoft.com/office/drawing/2014/main" id="{F94E0085-60CE-404C-BCAC-0CF9854A434A}"/>
               </a:ext>
             </a:extLst>
           </p:cNvPr>
@@ -15324,7 +15324,7 @@
             <a:hlinkClick r:id="rId3" action="ppaction://hlinkfile"/>
             <a:extLst>
               <a:ext uri="{FF2B5EF4-FFF2-40B4-BE49-F238E27FC236}">
-                <a16:creationId xmlns:a16="http://schemas.microsoft.com/office/drawing/2014/main" xmlns="" id="{7AAE4CC5-587F-457A-90DB-4F863FF2413F}"/>
+                <a16:creationId xmlns="" xmlns:a16="http://schemas.microsoft.com/office/drawing/2014/main" id="{7AAE4CC5-587F-457A-90DB-4F863FF2413F}"/>
               </a:ext>
             </a:extLst>
           </p:cNvPr>
@@ -15379,7 +15379,7 @@
           <p:cNvPr id="3" name="Google Shape;301;p19">
             <a:extLst>
               <a:ext uri="{FF2B5EF4-FFF2-40B4-BE49-F238E27FC236}">
-                <a16:creationId xmlns:a16="http://schemas.microsoft.com/office/drawing/2014/main" xmlns="" id="{07C25429-B0E0-45FD-9111-CF1EF789F2BB}"/>
+                <a16:creationId xmlns="" xmlns:a16="http://schemas.microsoft.com/office/drawing/2014/main" id="{07C25429-B0E0-45FD-9111-CF1EF789F2BB}"/>
               </a:ext>
             </a:extLst>
           </p:cNvPr>
@@ -15442,7 +15442,7 @@
           <p:cNvPr id="7" name="Imagen 6" descr="Imagen que contiene texto, mapa, firmar, pantalla&#10;&#10;Descripción generada automáticamente">
             <a:extLst>
               <a:ext uri="{FF2B5EF4-FFF2-40B4-BE49-F238E27FC236}">
-                <a16:creationId xmlns:a16="http://schemas.microsoft.com/office/drawing/2014/main" xmlns="" id="{518FD45F-8C81-4609-AE74-7F9639C87971}"/>
+                <a16:creationId xmlns="" xmlns:a16="http://schemas.microsoft.com/office/drawing/2014/main" id="{518FD45F-8C81-4609-AE74-7F9639C87971}"/>
               </a:ext>
             </a:extLst>
           </p:cNvPr>
@@ -15651,7 +15651,7 @@
           <p:cNvPr id="10" name="Google Shape;301;p19">
             <a:extLst>
               <a:ext uri="{FF2B5EF4-FFF2-40B4-BE49-F238E27FC236}">
-                <a16:creationId xmlns:a16="http://schemas.microsoft.com/office/drawing/2014/main" xmlns="" id="{85A0AAD9-674A-429D-857B-225C345815AE}"/>
+                <a16:creationId xmlns="" xmlns:a16="http://schemas.microsoft.com/office/drawing/2014/main" id="{85A0AAD9-674A-429D-857B-225C345815AE}"/>
               </a:ext>
             </a:extLst>
           </p:cNvPr>
@@ -15747,7 +15747,7 @@
           <p:cNvPr id="6" name="Google Shape;240;p11">
             <a:extLst>
               <a:ext uri="{FF2B5EF4-FFF2-40B4-BE49-F238E27FC236}">
-                <a16:creationId xmlns:a16="http://schemas.microsoft.com/office/drawing/2014/main" xmlns="" id="{C60272C8-7E00-428B-A450-A1A749ED198D}"/>
+                <a16:creationId xmlns="" xmlns:a16="http://schemas.microsoft.com/office/drawing/2014/main" id="{C60272C8-7E00-428B-A450-A1A749ED198D}"/>
               </a:ext>
             </a:extLst>
           </p:cNvPr>
@@ -15794,7 +15794,7 @@
           <p:cNvPr id="2" name="Imagen 1">
             <a:extLst>
               <a:ext uri="{FF2B5EF4-FFF2-40B4-BE49-F238E27FC236}">
-                <a16:creationId xmlns:a16="http://schemas.microsoft.com/office/drawing/2014/main" xmlns="" id="{559731CF-29F4-40C9-ACFD-D11C7DA121B9}"/>
+                <a16:creationId xmlns="" xmlns:a16="http://schemas.microsoft.com/office/drawing/2014/main" id="{559731CF-29F4-40C9-ACFD-D11C7DA121B9}"/>
               </a:ext>
             </a:extLst>
           </p:cNvPr>
@@ -15849,7 +15849,7 @@
           <p:cNvPr id="2" name="Google Shape;301;p19">
             <a:extLst>
               <a:ext uri="{FF2B5EF4-FFF2-40B4-BE49-F238E27FC236}">
-                <a16:creationId xmlns:a16="http://schemas.microsoft.com/office/drawing/2014/main" xmlns="" id="{3FED4C02-61DE-4F9F-94DD-0F6AF5D2E7BF}"/>
+                <a16:creationId xmlns="" xmlns:a16="http://schemas.microsoft.com/office/drawing/2014/main" id="{3FED4C02-61DE-4F9F-94DD-0F6AF5D2E7BF}"/>
               </a:ext>
             </a:extLst>
           </p:cNvPr>
@@ -15926,7 +15926,7 @@
             <a:hlinkClick r:id="rId2" action="ppaction://hlinkfile"/>
             <a:extLst>
               <a:ext uri="{FF2B5EF4-FFF2-40B4-BE49-F238E27FC236}">
-                <a16:creationId xmlns:a16="http://schemas.microsoft.com/office/drawing/2014/main" xmlns="" id="{A5236D1D-0CEC-40A8-9152-D9F2A135E33C}"/>
+                <a16:creationId xmlns="" xmlns:a16="http://schemas.microsoft.com/office/drawing/2014/main" id="{A5236D1D-0CEC-40A8-9152-D9F2A135E33C}"/>
               </a:ext>
             </a:extLst>
           </p:cNvPr>
@@ -15986,7 +15986,7 @@
           <p:cNvPr id="2" name="Google Shape;301;p19">
             <a:extLst>
               <a:ext uri="{FF2B5EF4-FFF2-40B4-BE49-F238E27FC236}">
-                <a16:creationId xmlns:a16="http://schemas.microsoft.com/office/drawing/2014/main" xmlns="" id="{BC0DD5E3-4FC9-4392-ADE4-BBCA125527BC}"/>
+                <a16:creationId xmlns="" xmlns:a16="http://schemas.microsoft.com/office/drawing/2014/main" id="{BC0DD5E3-4FC9-4392-ADE4-BBCA125527BC}"/>
               </a:ext>
             </a:extLst>
           </p:cNvPr>
@@ -16050,7 +16050,7 @@
             <a:hlinkClick r:id="rId2" action="ppaction://hlinkfile"/>
             <a:extLst>
               <a:ext uri="{FF2B5EF4-FFF2-40B4-BE49-F238E27FC236}">
-                <a16:creationId xmlns:a16="http://schemas.microsoft.com/office/drawing/2014/main" xmlns="" id="{BADA6DF1-5BC8-44A4-A8E8-5DB3266EA975}"/>
+                <a16:creationId xmlns="" xmlns:a16="http://schemas.microsoft.com/office/drawing/2014/main" id="{BADA6DF1-5BC8-44A4-A8E8-5DB3266EA975}"/>
               </a:ext>
             </a:extLst>
           </p:cNvPr>
@@ -16109,7 +16109,7 @@
           <p:cNvPr id="2" name="Google Shape;301;p19">
             <a:extLst>
               <a:ext uri="{FF2B5EF4-FFF2-40B4-BE49-F238E27FC236}">
-                <a16:creationId xmlns:a16="http://schemas.microsoft.com/office/drawing/2014/main" xmlns="" id="{94AA6C33-C2F6-4658-9DB6-D1AFF50223D7}"/>
+                <a16:creationId xmlns="" xmlns:a16="http://schemas.microsoft.com/office/drawing/2014/main" id="{94AA6C33-C2F6-4658-9DB6-D1AFF50223D7}"/>
               </a:ext>
             </a:extLst>
           </p:cNvPr>
@@ -16186,7 +16186,7 @@
             <a:hlinkClick r:id="rId2" action="ppaction://hlinkfile"/>
             <a:extLst>
               <a:ext uri="{FF2B5EF4-FFF2-40B4-BE49-F238E27FC236}">
-                <a16:creationId xmlns:a16="http://schemas.microsoft.com/office/drawing/2014/main" xmlns="" id="{0FC15038-BA2F-4951-B4EA-6DE70AC43AF6}"/>
+                <a16:creationId xmlns="" xmlns:a16="http://schemas.microsoft.com/office/drawing/2014/main" id="{0FC15038-BA2F-4951-B4EA-6DE70AC43AF6}"/>
               </a:ext>
             </a:extLst>
           </p:cNvPr>
@@ -16246,7 +16246,7 @@
           <p:cNvPr id="2" name="Google Shape;301;p19">
             <a:extLst>
               <a:ext uri="{FF2B5EF4-FFF2-40B4-BE49-F238E27FC236}">
-                <a16:creationId xmlns:a16="http://schemas.microsoft.com/office/drawing/2014/main" xmlns="" id="{E522214F-E47E-4B62-800C-5EAF90E697CD}"/>
+                <a16:creationId xmlns="" xmlns:a16="http://schemas.microsoft.com/office/drawing/2014/main" id="{E522214F-E47E-4B62-800C-5EAF90E697CD}"/>
               </a:ext>
             </a:extLst>
           </p:cNvPr>
@@ -16322,7 +16322,7 @@
           <p:cNvPr id="3" name="Imagen 2">
             <a:extLst>
               <a:ext uri="{FF2B5EF4-FFF2-40B4-BE49-F238E27FC236}">
-                <a16:creationId xmlns:a16="http://schemas.microsoft.com/office/drawing/2014/main" xmlns="" id="{4D2B85AD-3AD7-4D9E-AEB1-8BB153F041F7}"/>
+                <a16:creationId xmlns="" xmlns:a16="http://schemas.microsoft.com/office/drawing/2014/main" id="{4D2B85AD-3AD7-4D9E-AEB1-8BB153F041F7}"/>
               </a:ext>
             </a:extLst>
           </p:cNvPr>
@@ -16382,7 +16382,7 @@
           <p:cNvPr id="4" name="Google Shape;301;p19">
             <a:extLst>
               <a:ext uri="{FF2B5EF4-FFF2-40B4-BE49-F238E27FC236}">
-                <a16:creationId xmlns:a16="http://schemas.microsoft.com/office/drawing/2014/main" xmlns="" id="{F08688CE-7072-4646-B0B7-BE5849D42FF5}"/>
+                <a16:creationId xmlns="" xmlns:a16="http://schemas.microsoft.com/office/drawing/2014/main" id="{F08688CE-7072-4646-B0B7-BE5849D42FF5}"/>
               </a:ext>
             </a:extLst>
           </p:cNvPr>
@@ -16475,7 +16475,7 @@
           <p:cNvPr id="2" name="Google Shape;301;p19">
             <a:extLst>
               <a:ext uri="{FF2B5EF4-FFF2-40B4-BE49-F238E27FC236}">
-                <a16:creationId xmlns:a16="http://schemas.microsoft.com/office/drawing/2014/main" xmlns="" id="{A55BF71A-6275-44E3-8979-459764B4C0E9}"/>
+                <a16:creationId xmlns="" xmlns:a16="http://schemas.microsoft.com/office/drawing/2014/main" id="{A55BF71A-6275-44E3-8979-459764B4C0E9}"/>
               </a:ext>
             </a:extLst>
           </p:cNvPr>
@@ -16555,7 +16555,7 @@
           <p:cNvPr id="3" name="Imagen 2">
             <a:extLst>
               <a:ext uri="{FF2B5EF4-FFF2-40B4-BE49-F238E27FC236}">
-                <a16:creationId xmlns:a16="http://schemas.microsoft.com/office/drawing/2014/main" xmlns="" id="{8907F45D-F0EB-4C72-A20F-15D830C6120A}"/>
+                <a16:creationId xmlns="" xmlns:a16="http://schemas.microsoft.com/office/drawing/2014/main" id="{8907F45D-F0EB-4C72-A20F-15D830C6120A}"/>
               </a:ext>
             </a:extLst>
           </p:cNvPr>
@@ -16585,7 +16585,7 @@
           <p:cNvPr id="4" name="Rectángulo 3">
             <a:extLst>
               <a:ext uri="{FF2B5EF4-FFF2-40B4-BE49-F238E27FC236}">
-                <a16:creationId xmlns:a16="http://schemas.microsoft.com/office/drawing/2014/main" xmlns="" id="{0B4F2E8C-C40B-40AD-99DC-991A85681726}"/>
+                <a16:creationId xmlns="" xmlns:a16="http://schemas.microsoft.com/office/drawing/2014/main" id="{0B4F2E8C-C40B-40AD-99DC-991A85681726}"/>
               </a:ext>
             </a:extLst>
           </p:cNvPr>
@@ -19150,19 +19150,7 @@
                 <a:cs typeface="Times New Roman"/>
                 <a:sym typeface="Times New Roman"/>
               </a:rPr>
-              <a:t>nacional</a:t>
-            </a:r>
-            <a:r>
-              <a:rPr lang="es-MX" sz="3000" dirty="0" smtClean="0">
-                <a:solidFill>
-                  <a:schemeClr val="dk1"/>
-                </a:solidFill>
-                <a:latin typeface="Times New Roman"/>
-                <a:ea typeface="Times New Roman"/>
-                <a:cs typeface="Times New Roman"/>
-                <a:sym typeface="Times New Roman"/>
-              </a:rPr>
-              <a:t> </a:t>
+              <a:t>nacional </a:t>
             </a:r>
             <a:r>
               <a:rPr lang="es-MX" sz="3000" dirty="0">

</xml_diff>